<commit_message>
New cross validation setup
</commit_message>
<xml_diff>
--- a/Brain Age Predictor - Combined.pptx
+++ b/Brain Age Predictor - Combined.pptx
@@ -270,7 +270,7 @@
           <a:p>
             <a:fld id="{A2DE3A2B-D65C-4F77-8A6E-C948129E1FAE}" type="datetimeFigureOut">
               <a:rPr lang="en-US" smtClean="0"/>
-              <a:t>5/13/2019</a:t>
+              <a:t>5/14/2019</a:t>
             </a:fld>
             <a:endParaRPr lang="en-US"/>
           </a:p>
@@ -468,7 +468,7 @@
           <a:p>
             <a:fld id="{A2DE3A2B-D65C-4F77-8A6E-C948129E1FAE}" type="datetimeFigureOut">
               <a:rPr lang="en-US" smtClean="0"/>
-              <a:t>5/13/2019</a:t>
+              <a:t>5/14/2019</a:t>
             </a:fld>
             <a:endParaRPr lang="en-US"/>
           </a:p>
@@ -676,7 +676,7 @@
           <a:p>
             <a:fld id="{A2DE3A2B-D65C-4F77-8A6E-C948129E1FAE}" type="datetimeFigureOut">
               <a:rPr lang="en-US" smtClean="0"/>
-              <a:t>5/13/2019</a:t>
+              <a:t>5/14/2019</a:t>
             </a:fld>
             <a:endParaRPr lang="en-US"/>
           </a:p>
@@ -874,7 +874,7 @@
           <a:p>
             <a:fld id="{A2DE3A2B-D65C-4F77-8A6E-C948129E1FAE}" type="datetimeFigureOut">
               <a:rPr lang="en-US" smtClean="0"/>
-              <a:t>5/13/2019</a:t>
+              <a:t>5/14/2019</a:t>
             </a:fld>
             <a:endParaRPr lang="en-US"/>
           </a:p>
@@ -1149,7 +1149,7 @@
           <a:p>
             <a:fld id="{A2DE3A2B-D65C-4F77-8A6E-C948129E1FAE}" type="datetimeFigureOut">
               <a:rPr lang="en-US" smtClean="0"/>
-              <a:t>5/13/2019</a:t>
+              <a:t>5/14/2019</a:t>
             </a:fld>
             <a:endParaRPr lang="en-US"/>
           </a:p>
@@ -1414,7 +1414,7 @@
           <a:p>
             <a:fld id="{A2DE3A2B-D65C-4F77-8A6E-C948129E1FAE}" type="datetimeFigureOut">
               <a:rPr lang="en-US" smtClean="0"/>
-              <a:t>5/13/2019</a:t>
+              <a:t>5/14/2019</a:t>
             </a:fld>
             <a:endParaRPr lang="en-US"/>
           </a:p>
@@ -1826,7 +1826,7 @@
           <a:p>
             <a:fld id="{A2DE3A2B-D65C-4F77-8A6E-C948129E1FAE}" type="datetimeFigureOut">
               <a:rPr lang="en-US" smtClean="0"/>
-              <a:t>5/13/2019</a:t>
+              <a:t>5/14/2019</a:t>
             </a:fld>
             <a:endParaRPr lang="en-US"/>
           </a:p>
@@ -1967,7 +1967,7 @@
           <a:p>
             <a:fld id="{A2DE3A2B-D65C-4F77-8A6E-C948129E1FAE}" type="datetimeFigureOut">
               <a:rPr lang="en-US" smtClean="0"/>
-              <a:t>5/13/2019</a:t>
+              <a:t>5/14/2019</a:t>
             </a:fld>
             <a:endParaRPr lang="en-US"/>
           </a:p>
@@ -2080,7 +2080,7 @@
           <a:p>
             <a:fld id="{A2DE3A2B-D65C-4F77-8A6E-C948129E1FAE}" type="datetimeFigureOut">
               <a:rPr lang="en-US" smtClean="0"/>
-              <a:t>5/13/2019</a:t>
+              <a:t>5/14/2019</a:t>
             </a:fld>
             <a:endParaRPr lang="en-US"/>
           </a:p>
@@ -2391,7 +2391,7 @@
           <a:p>
             <a:fld id="{A2DE3A2B-D65C-4F77-8A6E-C948129E1FAE}" type="datetimeFigureOut">
               <a:rPr lang="en-US" smtClean="0"/>
-              <a:t>5/13/2019</a:t>
+              <a:t>5/14/2019</a:t>
             </a:fld>
             <a:endParaRPr lang="en-US"/>
           </a:p>
@@ -2679,7 +2679,7 @@
           <a:p>
             <a:fld id="{A2DE3A2B-D65C-4F77-8A6E-C948129E1FAE}" type="datetimeFigureOut">
               <a:rPr lang="en-US" smtClean="0"/>
-              <a:t>5/13/2019</a:t>
+              <a:t>5/14/2019</a:t>
             </a:fld>
             <a:endParaRPr lang="en-US"/>
           </a:p>
@@ -2920,7 +2920,7 @@
           <a:p>
             <a:fld id="{A2DE3A2B-D65C-4F77-8A6E-C948129E1FAE}" type="datetimeFigureOut">
               <a:rPr lang="en-US" smtClean="0"/>
-              <a:t>5/13/2019</a:t>
+              <a:t>5/14/2019</a:t>
             </a:fld>
             <a:endParaRPr lang="en-US"/>
           </a:p>
@@ -3855,8 +3855,8 @@
           </a:p>
         </p:txBody>
       </p:sp>
-      <mc:AlternateContent xmlns:mc="http://schemas.openxmlformats.org/markup-compatibility/2006">
-        <mc:Choice xmlns:a14="http://schemas.microsoft.com/office/drawing/2010/main" Requires="a14">
+      <mc:AlternateContent xmlns:mc="http://schemas.openxmlformats.org/markup-compatibility/2006" xmlns:a14="http://schemas.microsoft.com/office/drawing/2010/main">
+        <mc:Choice Requires="a14">
           <p:sp>
             <p:nvSpPr>
               <p:cNvPr id="3" name="Content Placeholder 2">
@@ -3971,13 +3971,13 @@
                           <a:rPr lang="en-US" i="1" dirty="0" smtClean="0">
                             <a:latin typeface="Cambria Math" panose="02040503050406030204" pitchFamily="18" charset="0"/>
                           </a:rPr>
-                          <m:t>𝑦𝑇𝑟</m:t>
+                          <m:t>𝑦𝑇𝑟𝑢</m:t>
                         </m:r>
                         <m:r>
                           <a:rPr lang="en-US" b="0" i="1" dirty="0" smtClean="0">
                             <a:latin typeface="Cambria Math" panose="02040503050406030204" pitchFamily="18" charset="0"/>
                           </a:rPr>
-                          <m:t>𝑢𝑒</m:t>
+                          <m:t>𝑒</m:t>
                         </m:r>
                       </m:num>
                       <m:den>
@@ -4073,7 +4073,7 @@
             </p:txBody>
           </p:sp>
         </mc:Choice>
-        <mc:Fallback>
+        <mc:Fallback xmlns="">
           <p:sp>
             <p:nvSpPr>
               <p:cNvPr id="3" name="Content Placeholder 2">

</xml_diff>